<commit_message>
auf 2016 angepasste daten
</commit_message>
<xml_diff>
--- a/folien/Semester_04_Termin_01_Kapitel09.pptx
+++ b/folien/Semester_04_Termin_01_Kapitel09.pptx
@@ -173,7 +173,7 @@
   </p:defaultTextStyle>
   <p:extLst>
     <p:ext uri="{EFAFB233-063F-42B5-8137-9DF3F51BA10A}">
-      <p15:sldGuideLst xmlns:p15="http://schemas.microsoft.com/office/powerpoint/2012/main" xmlns="">
+      <p15:sldGuideLst xmlns:p15="http://schemas.microsoft.com/office/powerpoint/2012/main">
         <p15:guide id="1" orient="horz" pos="2160">
           <p15:clr>
             <a:srgbClr val="A4A3A4"/>
@@ -187,7 +187,7 @@
       </p15:sldGuideLst>
     </p:ext>
     <p:ext uri="{2D200454-40CA-4A62-9FC3-DE9A4176ACB9}">
-      <p15:notesGuideLst xmlns:p15="http://schemas.microsoft.com/office/powerpoint/2012/main" xmlns="">
+      <p15:notesGuideLst xmlns:p15="http://schemas.microsoft.com/office/powerpoint/2012/main">
         <p15:guide id="1" orient="horz" pos="2880">
           <p15:clr>
             <a:srgbClr val="A4A3A4"/>
@@ -282,14 +282,14 @@
           <a:effectLst/>
           <a:extLst>
             <a:ext uri="{909E8E84-426E-40DD-AFC4-6F175D3DCCD1}">
-              <a14:hiddenFill xmlns:a14="http://schemas.microsoft.com/office/drawing/2010/main" xmlns="">
+              <a14:hiddenFill xmlns:a14="http://schemas.microsoft.com/office/drawing/2010/main">
                 <a:solidFill>
                   <a:srgbClr val="FFFFFF"/>
                 </a:solidFill>
               </a14:hiddenFill>
             </a:ext>
             <a:ext uri="{91240B29-F687-4F45-9708-019B960494DF}">
-              <a14:hiddenLine xmlns:a14="http://schemas.microsoft.com/office/drawing/2010/main" xmlns="" w="9525">
+              <a14:hiddenLine xmlns:a14="http://schemas.microsoft.com/office/drawing/2010/main" w="9525">
                 <a:solidFill>
                   <a:srgbClr val="000000"/>
                 </a:solidFill>
@@ -299,7 +299,7 @@
               </a14:hiddenLine>
             </a:ext>
             <a:ext uri="{AF507438-7753-43E0-B8FC-AC1667EBCBE1}">
-              <a14:hiddenEffects xmlns:a14="http://schemas.microsoft.com/office/drawing/2010/main" xmlns="">
+              <a14:hiddenEffects xmlns:a14="http://schemas.microsoft.com/office/drawing/2010/main">
                 <a:effectLst>
                   <a:outerShdw dist="35921" dir="2700000" algn="ctr" rotWithShape="0">
                     <a:schemeClr val="bg2"/>
@@ -347,14 +347,14 @@
           <a:effectLst/>
           <a:extLst>
             <a:ext uri="{909E8E84-426E-40DD-AFC4-6F175D3DCCD1}">
-              <a14:hiddenFill xmlns:a14="http://schemas.microsoft.com/office/drawing/2010/main" xmlns="">
+              <a14:hiddenFill xmlns:a14="http://schemas.microsoft.com/office/drawing/2010/main">
                 <a:solidFill>
                   <a:srgbClr val="FFFFFF"/>
                 </a:solidFill>
               </a14:hiddenFill>
             </a:ext>
             <a:ext uri="{91240B29-F687-4F45-9708-019B960494DF}">
-              <a14:hiddenLine xmlns:a14="http://schemas.microsoft.com/office/drawing/2010/main" xmlns="" w="9525">
+              <a14:hiddenLine xmlns:a14="http://schemas.microsoft.com/office/drawing/2010/main" w="9525">
                 <a:solidFill>
                   <a:srgbClr val="000000"/>
                 </a:solidFill>
@@ -364,7 +364,7 @@
               </a14:hiddenLine>
             </a:ext>
             <a:ext uri="{AF507438-7753-43E0-B8FC-AC1667EBCBE1}">
-              <a14:hiddenEffects xmlns:a14="http://schemas.microsoft.com/office/drawing/2010/main" xmlns="">
+              <a14:hiddenEffects xmlns:a14="http://schemas.microsoft.com/office/drawing/2010/main">
                 <a:effectLst>
                   <a:outerShdw dist="35921" dir="2700000" algn="ctr" rotWithShape="0">
                     <a:schemeClr val="bg2"/>
@@ -439,14 +439,14 @@
           <a:effectLst/>
           <a:extLst>
             <a:ext uri="{909E8E84-426E-40DD-AFC4-6F175D3DCCD1}">
-              <a14:hiddenFill xmlns:a14="http://schemas.microsoft.com/office/drawing/2010/main" xmlns="">
+              <a14:hiddenFill xmlns:a14="http://schemas.microsoft.com/office/drawing/2010/main">
                 <a:solidFill>
                   <a:srgbClr val="FFFFFF"/>
                 </a:solidFill>
               </a14:hiddenFill>
             </a:ext>
             <a:ext uri="{91240B29-F687-4F45-9708-019B960494DF}">
-              <a14:hiddenLine xmlns:a14="http://schemas.microsoft.com/office/drawing/2010/main" xmlns="" w="9525">
+              <a14:hiddenLine xmlns:a14="http://schemas.microsoft.com/office/drawing/2010/main" w="9525">
                 <a:solidFill>
                   <a:srgbClr val="000000"/>
                 </a:solidFill>
@@ -456,7 +456,7 @@
               </a14:hiddenLine>
             </a:ext>
             <a:ext uri="{AF507438-7753-43E0-B8FC-AC1667EBCBE1}">
-              <a14:hiddenEffects xmlns:a14="http://schemas.microsoft.com/office/drawing/2010/main" xmlns="">
+              <a14:hiddenEffects xmlns:a14="http://schemas.microsoft.com/office/drawing/2010/main">
                 <a:effectLst>
                   <a:outerShdw dist="35921" dir="2700000" algn="ctr" rotWithShape="0">
                     <a:schemeClr val="bg2"/>
@@ -531,14 +531,14 @@
           <a:effectLst/>
           <a:extLst>
             <a:ext uri="{909E8E84-426E-40DD-AFC4-6F175D3DCCD1}">
-              <a14:hiddenFill xmlns:a14="http://schemas.microsoft.com/office/drawing/2010/main" xmlns="">
+              <a14:hiddenFill xmlns:a14="http://schemas.microsoft.com/office/drawing/2010/main">
                 <a:solidFill>
                   <a:srgbClr val="FFFFFF"/>
                 </a:solidFill>
               </a14:hiddenFill>
             </a:ext>
             <a:ext uri="{91240B29-F687-4F45-9708-019B960494DF}">
-              <a14:hiddenLine xmlns:a14="http://schemas.microsoft.com/office/drawing/2010/main" xmlns="" w="9525">
+              <a14:hiddenLine xmlns:a14="http://schemas.microsoft.com/office/drawing/2010/main" w="9525">
                 <a:solidFill>
                   <a:srgbClr val="000000"/>
                 </a:solidFill>
@@ -548,7 +548,7 @@
               </a14:hiddenLine>
             </a:ext>
             <a:ext uri="{AF507438-7753-43E0-B8FC-AC1667EBCBE1}">
-              <a14:hiddenEffects xmlns:a14="http://schemas.microsoft.com/office/drawing/2010/main" xmlns="">
+              <a14:hiddenEffects xmlns:a14="http://schemas.microsoft.com/office/drawing/2010/main">
                 <a:effectLst>
                   <a:outerShdw dist="35921" dir="2700000" algn="ctr" rotWithShape="0">
                     <a:schemeClr val="bg2"/>
@@ -623,14 +623,14 @@
           <a:effectLst/>
           <a:extLst>
             <a:ext uri="{909E8E84-426E-40DD-AFC4-6F175D3DCCD1}">
-              <a14:hiddenFill xmlns:a14="http://schemas.microsoft.com/office/drawing/2010/main" xmlns="">
+              <a14:hiddenFill xmlns:a14="http://schemas.microsoft.com/office/drawing/2010/main">
                 <a:solidFill>
                   <a:srgbClr val="FFFFFF"/>
                 </a:solidFill>
               </a14:hiddenFill>
             </a:ext>
             <a:ext uri="{91240B29-F687-4F45-9708-019B960494DF}">
-              <a14:hiddenLine xmlns:a14="http://schemas.microsoft.com/office/drawing/2010/main" xmlns="" w="9525">
+              <a14:hiddenLine xmlns:a14="http://schemas.microsoft.com/office/drawing/2010/main" w="9525">
                 <a:solidFill>
                   <a:srgbClr val="000000"/>
                 </a:solidFill>
@@ -640,7 +640,7 @@
               </a14:hiddenLine>
             </a:ext>
             <a:ext uri="{AF507438-7753-43E0-B8FC-AC1667EBCBE1}">
-              <a14:hiddenEffects xmlns:a14="http://schemas.microsoft.com/office/drawing/2010/main" xmlns="">
+              <a14:hiddenEffects xmlns:a14="http://schemas.microsoft.com/office/drawing/2010/main">
                 <a:effectLst>
                   <a:outerShdw dist="35921" dir="2700000" algn="ctr" rotWithShape="0">
                     <a:schemeClr val="bg2"/>
@@ -694,7 +694,7 @@
     </p:spTree>
     <p:extLst>
       <p:ext uri="{BB962C8B-B14F-4D97-AF65-F5344CB8AC3E}">
-        <p14:creationId xmlns:p14="http://schemas.microsoft.com/office/powerpoint/2010/main" xmlns="" val="1918974402"/>
+        <p14:creationId xmlns:p14="http://schemas.microsoft.com/office/powerpoint/2010/main" val="1918974402"/>
       </p:ext>
     </p:extLst>
   </p:cSld>
@@ -961,7 +961,7 @@
     </p:spTree>
     <p:extLst>
       <p:ext uri="{BB962C8B-B14F-4D97-AF65-F5344CB8AC3E}">
-        <p14:creationId xmlns:p14="http://schemas.microsoft.com/office/powerpoint/2010/main" xmlns="" val="42050546"/>
+        <p14:creationId xmlns:p14="http://schemas.microsoft.com/office/powerpoint/2010/main" val="42050546"/>
       </p:ext>
     </p:extLst>
   </p:cSld>
@@ -1083,7 +1083,7 @@
     </p:spTree>
     <p:extLst>
       <p:ext uri="{BB962C8B-B14F-4D97-AF65-F5344CB8AC3E}">
-        <p14:creationId xmlns:p14="http://schemas.microsoft.com/office/powerpoint/2010/main" xmlns="" val="3695878693"/>
+        <p14:creationId xmlns:p14="http://schemas.microsoft.com/office/powerpoint/2010/main" val="3695878693"/>
       </p:ext>
     </p:extLst>
   </p:cSld>
@@ -1205,7 +1205,7 @@
     </p:spTree>
     <p:extLst>
       <p:ext uri="{BB962C8B-B14F-4D97-AF65-F5344CB8AC3E}">
-        <p14:creationId xmlns:p14="http://schemas.microsoft.com/office/powerpoint/2010/main" xmlns="" val="956622683"/>
+        <p14:creationId xmlns:p14="http://schemas.microsoft.com/office/powerpoint/2010/main" val="956622683"/>
       </p:ext>
     </p:extLst>
   </p:cSld>
@@ -1327,7 +1327,7 @@
     </p:spTree>
     <p:extLst>
       <p:ext uri="{BB962C8B-B14F-4D97-AF65-F5344CB8AC3E}">
-        <p14:creationId xmlns:p14="http://schemas.microsoft.com/office/powerpoint/2010/main" xmlns="" val="4247299366"/>
+        <p14:creationId xmlns:p14="http://schemas.microsoft.com/office/powerpoint/2010/main" val="4247299366"/>
       </p:ext>
     </p:extLst>
   </p:cSld>
@@ -1449,7 +1449,7 @@
     </p:spTree>
     <p:extLst>
       <p:ext uri="{BB962C8B-B14F-4D97-AF65-F5344CB8AC3E}">
-        <p14:creationId xmlns:p14="http://schemas.microsoft.com/office/powerpoint/2010/main" xmlns="" val="832768815"/>
+        <p14:creationId xmlns:p14="http://schemas.microsoft.com/office/powerpoint/2010/main" val="832768815"/>
       </p:ext>
     </p:extLst>
   </p:cSld>
@@ -1571,7 +1571,7 @@
     </p:spTree>
     <p:extLst>
       <p:ext uri="{BB962C8B-B14F-4D97-AF65-F5344CB8AC3E}">
-        <p14:creationId xmlns:p14="http://schemas.microsoft.com/office/powerpoint/2010/main" xmlns="" val="1823494493"/>
+        <p14:creationId xmlns:p14="http://schemas.microsoft.com/office/powerpoint/2010/main" val="1823494493"/>
       </p:ext>
     </p:extLst>
   </p:cSld>
@@ -1693,7 +1693,7 @@
     </p:spTree>
     <p:extLst>
       <p:ext uri="{BB962C8B-B14F-4D97-AF65-F5344CB8AC3E}">
-        <p14:creationId xmlns:p14="http://schemas.microsoft.com/office/powerpoint/2010/main" xmlns="" val="3764620127"/>
+        <p14:creationId xmlns:p14="http://schemas.microsoft.com/office/powerpoint/2010/main" val="3764620127"/>
       </p:ext>
     </p:extLst>
   </p:cSld>
@@ -1815,7 +1815,7 @@
     </p:spTree>
     <p:extLst>
       <p:ext uri="{BB962C8B-B14F-4D97-AF65-F5344CB8AC3E}">
-        <p14:creationId xmlns:p14="http://schemas.microsoft.com/office/powerpoint/2010/main" xmlns="" val="3172697500"/>
+        <p14:creationId xmlns:p14="http://schemas.microsoft.com/office/powerpoint/2010/main" val="3172697500"/>
       </p:ext>
     </p:extLst>
   </p:cSld>
@@ -1937,7 +1937,7 @@
     </p:spTree>
     <p:extLst>
       <p:ext uri="{BB962C8B-B14F-4D97-AF65-F5344CB8AC3E}">
-        <p14:creationId xmlns:p14="http://schemas.microsoft.com/office/powerpoint/2010/main" xmlns="" val="3962970376"/>
+        <p14:creationId xmlns:p14="http://schemas.microsoft.com/office/powerpoint/2010/main" val="3962970376"/>
       </p:ext>
     </p:extLst>
   </p:cSld>
@@ -2059,7 +2059,7 @@
     </p:spTree>
     <p:extLst>
       <p:ext uri="{BB962C8B-B14F-4D97-AF65-F5344CB8AC3E}">
-        <p14:creationId xmlns:p14="http://schemas.microsoft.com/office/powerpoint/2010/main" xmlns="" val="2260329551"/>
+        <p14:creationId xmlns:p14="http://schemas.microsoft.com/office/powerpoint/2010/main" val="2260329551"/>
       </p:ext>
     </p:extLst>
   </p:cSld>
@@ -2181,7 +2181,7 @@
     </p:spTree>
     <p:extLst>
       <p:ext uri="{BB962C8B-B14F-4D97-AF65-F5344CB8AC3E}">
-        <p14:creationId xmlns:p14="http://schemas.microsoft.com/office/powerpoint/2010/main" xmlns="" val="1114755399"/>
+        <p14:creationId xmlns:p14="http://schemas.microsoft.com/office/powerpoint/2010/main" val="1114755399"/>
       </p:ext>
     </p:extLst>
   </p:cSld>
@@ -2303,7 +2303,7 @@
     </p:spTree>
     <p:extLst>
       <p:ext uri="{BB962C8B-B14F-4D97-AF65-F5344CB8AC3E}">
-        <p14:creationId xmlns:p14="http://schemas.microsoft.com/office/powerpoint/2010/main" xmlns="" val="1317698827"/>
+        <p14:creationId xmlns:p14="http://schemas.microsoft.com/office/powerpoint/2010/main" val="1317698827"/>
       </p:ext>
     </p:extLst>
   </p:cSld>
@@ -2425,7 +2425,7 @@
     </p:spTree>
     <p:extLst>
       <p:ext uri="{BB962C8B-B14F-4D97-AF65-F5344CB8AC3E}">
-        <p14:creationId xmlns:p14="http://schemas.microsoft.com/office/powerpoint/2010/main" xmlns="" val="2523161732"/>
+        <p14:creationId xmlns:p14="http://schemas.microsoft.com/office/powerpoint/2010/main" val="2523161732"/>
       </p:ext>
     </p:extLst>
   </p:cSld>
@@ -2547,7 +2547,7 @@
     </p:spTree>
     <p:extLst>
       <p:ext uri="{BB962C8B-B14F-4D97-AF65-F5344CB8AC3E}">
-        <p14:creationId xmlns:p14="http://schemas.microsoft.com/office/powerpoint/2010/main" xmlns="" val="4163731922"/>
+        <p14:creationId xmlns:p14="http://schemas.microsoft.com/office/powerpoint/2010/main" val="4163731922"/>
       </p:ext>
     </p:extLst>
   </p:cSld>
@@ -2669,7 +2669,7 @@
     </p:spTree>
     <p:extLst>
       <p:ext uri="{BB962C8B-B14F-4D97-AF65-F5344CB8AC3E}">
-        <p14:creationId xmlns:p14="http://schemas.microsoft.com/office/powerpoint/2010/main" xmlns="" val="4157049032"/>
+        <p14:creationId xmlns:p14="http://schemas.microsoft.com/office/powerpoint/2010/main" val="4157049032"/>
       </p:ext>
     </p:extLst>
   </p:cSld>
@@ -2791,7 +2791,7 @@
     </p:spTree>
     <p:extLst>
       <p:ext uri="{BB962C8B-B14F-4D97-AF65-F5344CB8AC3E}">
-        <p14:creationId xmlns:p14="http://schemas.microsoft.com/office/powerpoint/2010/main" xmlns="" val="1746510029"/>
+        <p14:creationId xmlns:p14="http://schemas.microsoft.com/office/powerpoint/2010/main" val="1746510029"/>
       </p:ext>
     </p:extLst>
   </p:cSld>
@@ -2913,7 +2913,7 @@
     </p:spTree>
     <p:extLst>
       <p:ext uri="{BB962C8B-B14F-4D97-AF65-F5344CB8AC3E}">
-        <p14:creationId xmlns:p14="http://schemas.microsoft.com/office/powerpoint/2010/main" xmlns="" val="200276390"/>
+        <p14:creationId xmlns:p14="http://schemas.microsoft.com/office/powerpoint/2010/main" val="200276390"/>
       </p:ext>
     </p:extLst>
   </p:cSld>
@@ -3035,7 +3035,7 @@
     </p:spTree>
     <p:extLst>
       <p:ext uri="{BB962C8B-B14F-4D97-AF65-F5344CB8AC3E}">
-        <p14:creationId xmlns:p14="http://schemas.microsoft.com/office/powerpoint/2010/main" xmlns="" val="3776665909"/>
+        <p14:creationId xmlns:p14="http://schemas.microsoft.com/office/powerpoint/2010/main" val="3776665909"/>
       </p:ext>
     </p:extLst>
   </p:cSld>
@@ -3157,7 +3157,7 @@
     </p:spTree>
     <p:extLst>
       <p:ext uri="{BB962C8B-B14F-4D97-AF65-F5344CB8AC3E}">
-        <p14:creationId xmlns:p14="http://schemas.microsoft.com/office/powerpoint/2010/main" xmlns="" val="3478868481"/>
+        <p14:creationId xmlns:p14="http://schemas.microsoft.com/office/powerpoint/2010/main" val="3478868481"/>
       </p:ext>
     </p:extLst>
   </p:cSld>
@@ -3279,7 +3279,7 @@
     </p:spTree>
     <p:extLst>
       <p:ext uri="{BB962C8B-B14F-4D97-AF65-F5344CB8AC3E}">
-        <p14:creationId xmlns:p14="http://schemas.microsoft.com/office/powerpoint/2010/main" xmlns="" val="4253673966"/>
+        <p14:creationId xmlns:p14="http://schemas.microsoft.com/office/powerpoint/2010/main" val="4253673966"/>
       </p:ext>
     </p:extLst>
   </p:cSld>
@@ -3401,7 +3401,7 @@
     </p:spTree>
     <p:extLst>
       <p:ext uri="{BB962C8B-B14F-4D97-AF65-F5344CB8AC3E}">
-        <p14:creationId xmlns:p14="http://schemas.microsoft.com/office/powerpoint/2010/main" xmlns="" val="1344981799"/>
+        <p14:creationId xmlns:p14="http://schemas.microsoft.com/office/powerpoint/2010/main" val="1344981799"/>
       </p:ext>
     </p:extLst>
   </p:cSld>
@@ -3523,7 +3523,7 @@
     </p:spTree>
     <p:extLst>
       <p:ext uri="{BB962C8B-B14F-4D97-AF65-F5344CB8AC3E}">
-        <p14:creationId xmlns:p14="http://schemas.microsoft.com/office/powerpoint/2010/main" xmlns="" val="1883092408"/>
+        <p14:creationId xmlns:p14="http://schemas.microsoft.com/office/powerpoint/2010/main" val="1883092408"/>
       </p:ext>
     </p:extLst>
   </p:cSld>
@@ -3645,7 +3645,7 @@
     </p:spTree>
     <p:extLst>
       <p:ext uri="{BB962C8B-B14F-4D97-AF65-F5344CB8AC3E}">
-        <p14:creationId xmlns:p14="http://schemas.microsoft.com/office/powerpoint/2010/main" xmlns="" val="3834770153"/>
+        <p14:creationId xmlns:p14="http://schemas.microsoft.com/office/powerpoint/2010/main" val="3834770153"/>
       </p:ext>
     </p:extLst>
   </p:cSld>
@@ -3767,7 +3767,7 @@
     </p:spTree>
     <p:extLst>
       <p:ext uri="{BB962C8B-B14F-4D97-AF65-F5344CB8AC3E}">
-        <p14:creationId xmlns:p14="http://schemas.microsoft.com/office/powerpoint/2010/main" xmlns="" val="3859950044"/>
+        <p14:creationId xmlns:p14="http://schemas.microsoft.com/office/powerpoint/2010/main" val="3859950044"/>
       </p:ext>
     </p:extLst>
   </p:cSld>
@@ -3889,7 +3889,7 @@
     </p:spTree>
     <p:extLst>
       <p:ext uri="{BB962C8B-B14F-4D97-AF65-F5344CB8AC3E}">
-        <p14:creationId xmlns:p14="http://schemas.microsoft.com/office/powerpoint/2010/main" xmlns="" val="2801704936"/>
+        <p14:creationId xmlns:p14="http://schemas.microsoft.com/office/powerpoint/2010/main" val="2801704936"/>
       </p:ext>
     </p:extLst>
   </p:cSld>
@@ -4011,7 +4011,7 @@
     </p:spTree>
     <p:extLst>
       <p:ext uri="{BB962C8B-B14F-4D97-AF65-F5344CB8AC3E}">
-        <p14:creationId xmlns:p14="http://schemas.microsoft.com/office/powerpoint/2010/main" xmlns="" val="306331640"/>
+        <p14:creationId xmlns:p14="http://schemas.microsoft.com/office/powerpoint/2010/main" val="306331640"/>
       </p:ext>
     </p:extLst>
   </p:cSld>
@@ -4133,7 +4133,7 @@
     </p:spTree>
     <p:extLst>
       <p:ext uri="{BB962C8B-B14F-4D97-AF65-F5344CB8AC3E}">
-        <p14:creationId xmlns:p14="http://schemas.microsoft.com/office/powerpoint/2010/main" xmlns="" val="2840300364"/>
+        <p14:creationId xmlns:p14="http://schemas.microsoft.com/office/powerpoint/2010/main" val="2840300364"/>
       </p:ext>
     </p:extLst>
   </p:cSld>
@@ -4255,7 +4255,7 @@
     </p:spTree>
     <p:extLst>
       <p:ext uri="{BB962C8B-B14F-4D97-AF65-F5344CB8AC3E}">
-        <p14:creationId xmlns:p14="http://schemas.microsoft.com/office/powerpoint/2010/main" xmlns="" val="1403514416"/>
+        <p14:creationId xmlns:p14="http://schemas.microsoft.com/office/powerpoint/2010/main" val="1403514416"/>
       </p:ext>
     </p:extLst>
   </p:cSld>
@@ -4377,7 +4377,7 @@
     </p:spTree>
     <p:extLst>
       <p:ext uri="{BB962C8B-B14F-4D97-AF65-F5344CB8AC3E}">
-        <p14:creationId xmlns:p14="http://schemas.microsoft.com/office/powerpoint/2010/main" xmlns="" val="2488373299"/>
+        <p14:creationId xmlns:p14="http://schemas.microsoft.com/office/powerpoint/2010/main" val="2488373299"/>
       </p:ext>
     </p:extLst>
   </p:cSld>
@@ -4499,7 +4499,7 @@
     </p:spTree>
     <p:extLst>
       <p:ext uri="{BB962C8B-B14F-4D97-AF65-F5344CB8AC3E}">
-        <p14:creationId xmlns:p14="http://schemas.microsoft.com/office/powerpoint/2010/main" xmlns="" val="1608900027"/>
+        <p14:creationId xmlns:p14="http://schemas.microsoft.com/office/powerpoint/2010/main" val="1608900027"/>
       </p:ext>
     </p:extLst>
   </p:cSld>
@@ -4621,7 +4621,7 @@
     </p:spTree>
     <p:extLst>
       <p:ext uri="{BB962C8B-B14F-4D97-AF65-F5344CB8AC3E}">
-        <p14:creationId xmlns:p14="http://schemas.microsoft.com/office/powerpoint/2010/main" xmlns="" val="3507959500"/>
+        <p14:creationId xmlns:p14="http://schemas.microsoft.com/office/powerpoint/2010/main" val="3507959500"/>
       </p:ext>
     </p:extLst>
   </p:cSld>
@@ -4743,7 +4743,7 @@
     </p:spTree>
     <p:extLst>
       <p:ext uri="{BB962C8B-B14F-4D97-AF65-F5344CB8AC3E}">
-        <p14:creationId xmlns:p14="http://schemas.microsoft.com/office/powerpoint/2010/main" xmlns="" val="574178272"/>
+        <p14:creationId xmlns:p14="http://schemas.microsoft.com/office/powerpoint/2010/main" val="574178272"/>
       </p:ext>
     </p:extLst>
   </p:cSld>
@@ -4865,7 +4865,7 @@
     </p:spTree>
     <p:extLst>
       <p:ext uri="{BB962C8B-B14F-4D97-AF65-F5344CB8AC3E}">
-        <p14:creationId xmlns:p14="http://schemas.microsoft.com/office/powerpoint/2010/main" xmlns="" val="4221654177"/>
+        <p14:creationId xmlns:p14="http://schemas.microsoft.com/office/powerpoint/2010/main" val="4221654177"/>
       </p:ext>
     </p:extLst>
   </p:cSld>
@@ -4987,7 +4987,7 @@
     </p:spTree>
     <p:extLst>
       <p:ext uri="{BB962C8B-B14F-4D97-AF65-F5344CB8AC3E}">
-        <p14:creationId xmlns:p14="http://schemas.microsoft.com/office/powerpoint/2010/main" xmlns="" val="4263098502"/>
+        <p14:creationId xmlns:p14="http://schemas.microsoft.com/office/powerpoint/2010/main" val="4263098502"/>
       </p:ext>
     </p:extLst>
   </p:cSld>
@@ -5109,7 +5109,7 @@
     </p:spTree>
     <p:extLst>
       <p:ext uri="{BB962C8B-B14F-4D97-AF65-F5344CB8AC3E}">
-        <p14:creationId xmlns:p14="http://schemas.microsoft.com/office/powerpoint/2010/main" xmlns="" val="3084282577"/>
+        <p14:creationId xmlns:p14="http://schemas.microsoft.com/office/powerpoint/2010/main" val="3084282577"/>
       </p:ext>
     </p:extLst>
   </p:cSld>
@@ -7873,14 +7873,14 @@
           <a:effectLst/>
           <a:extLst>
             <a:ext uri="{909E8E84-426E-40DD-AFC4-6F175D3DCCD1}">
-              <a14:hiddenFill xmlns:a14="http://schemas.microsoft.com/office/drawing/2010/main" xmlns="">
+              <a14:hiddenFill xmlns:a14="http://schemas.microsoft.com/office/drawing/2010/main">
                 <a:solidFill>
                   <a:srgbClr val="FFFFFF"/>
                 </a:solidFill>
               </a14:hiddenFill>
             </a:ext>
             <a:ext uri="{91240B29-F687-4F45-9708-019B960494DF}">
-              <a14:hiddenLine xmlns:a14="http://schemas.microsoft.com/office/drawing/2010/main" xmlns="" w="9525">
+              <a14:hiddenLine xmlns:a14="http://schemas.microsoft.com/office/drawing/2010/main" w="9525">
                 <a:solidFill>
                   <a:srgbClr val="000000"/>
                 </a:solidFill>
@@ -7890,7 +7890,7 @@
               </a14:hiddenLine>
             </a:ext>
             <a:ext uri="{AF507438-7753-43E0-B8FC-AC1667EBCBE1}">
-              <a14:hiddenEffects xmlns:a14="http://schemas.microsoft.com/office/drawing/2010/main" xmlns="">
+              <a14:hiddenEffects xmlns:a14="http://schemas.microsoft.com/office/drawing/2010/main">
                 <a:effectLst>
                   <a:outerShdw dist="35921" dir="2700000" algn="ctr" rotWithShape="0">
                     <a:schemeClr val="bg2"/>
@@ -7964,14 +7964,14 @@
           <a:effectLst/>
           <a:extLst>
             <a:ext uri="{909E8E84-426E-40DD-AFC4-6F175D3DCCD1}">
-              <a14:hiddenFill xmlns:a14="http://schemas.microsoft.com/office/drawing/2010/main" xmlns="">
+              <a14:hiddenFill xmlns:a14="http://schemas.microsoft.com/office/drawing/2010/main">
                 <a:solidFill>
                   <a:srgbClr val="FFFFFF"/>
                 </a:solidFill>
               </a14:hiddenFill>
             </a:ext>
             <a:ext uri="{91240B29-F687-4F45-9708-019B960494DF}">
-              <a14:hiddenLine xmlns:a14="http://schemas.microsoft.com/office/drawing/2010/main" xmlns="" w="9525">
+              <a14:hiddenLine xmlns:a14="http://schemas.microsoft.com/office/drawing/2010/main" w="9525">
                 <a:solidFill>
                   <a:srgbClr val="000000"/>
                 </a:solidFill>
@@ -7981,7 +7981,7 @@
               </a14:hiddenLine>
             </a:ext>
             <a:ext uri="{AF507438-7753-43E0-B8FC-AC1667EBCBE1}">
-              <a14:hiddenEffects xmlns:a14="http://schemas.microsoft.com/office/drawing/2010/main" xmlns="">
+              <a14:hiddenEffects xmlns:a14="http://schemas.microsoft.com/office/drawing/2010/main">
                 <a:effectLst>
                   <a:outerShdw dist="35921" dir="2700000" algn="ctr" rotWithShape="0">
                     <a:schemeClr val="bg2"/>
@@ -8056,14 +8056,14 @@
           <a:effectLst/>
           <a:extLst>
             <a:ext uri="{909E8E84-426E-40DD-AFC4-6F175D3DCCD1}">
-              <a14:hiddenFill xmlns:a14="http://schemas.microsoft.com/office/drawing/2010/main" xmlns="">
+              <a14:hiddenFill xmlns:a14="http://schemas.microsoft.com/office/drawing/2010/main">
                 <a:solidFill>
                   <a:srgbClr val="FFFFFF"/>
                 </a:solidFill>
               </a14:hiddenFill>
             </a:ext>
             <a:ext uri="{91240B29-F687-4F45-9708-019B960494DF}">
-              <a14:hiddenLine xmlns:a14="http://schemas.microsoft.com/office/drawing/2010/main" xmlns="" w="9525">
+              <a14:hiddenLine xmlns:a14="http://schemas.microsoft.com/office/drawing/2010/main" w="9525">
                 <a:solidFill>
                   <a:srgbClr val="000000"/>
                 </a:solidFill>
@@ -8073,7 +8073,7 @@
               </a14:hiddenLine>
             </a:ext>
             <a:ext uri="{AF507438-7753-43E0-B8FC-AC1667EBCBE1}">
-              <a14:hiddenEffects xmlns:a14="http://schemas.microsoft.com/office/drawing/2010/main" xmlns="">
+              <a14:hiddenEffects xmlns:a14="http://schemas.microsoft.com/office/drawing/2010/main">
                 <a:effectLst>
                   <a:outerShdw dist="35921" dir="2700000" algn="ctr" rotWithShape="0">
                     <a:schemeClr val="bg2"/>
@@ -11421,23 +11421,7 @@
                   <a:srgbClr val="FFFFFF"/>
                 </a:solidFill>
               </a:rPr>
-              <a:t>Zu </a:t>
-            </a:r>
-            <a:r>
-              <a:rPr lang="de-DE" altLang="de-DE" sz="4000" dirty="0" smtClean="0">
-                <a:solidFill>
-                  <a:srgbClr val="FFFFFF"/>
-                </a:solidFill>
-              </a:rPr>
-              <a:t>Teil 2 </a:t>
-            </a:r>
-            <a:r>
-              <a:rPr lang="de-DE" altLang="de-DE" sz="4000" dirty="0" smtClean="0">
-                <a:solidFill>
-                  <a:srgbClr val="FFFFFF"/>
-                </a:solidFill>
-              </a:rPr>
-              <a:t>(1)</a:t>
+              <a:t>Zu Teil 2 (1)</a:t>
             </a:r>
           </a:p>
         </p:txBody>
@@ -11920,23 +11904,7 @@
                   <a:srgbClr val="FFFFFF"/>
                 </a:solidFill>
               </a:rPr>
-              <a:t>Zu </a:t>
-            </a:r>
-            <a:r>
-              <a:rPr lang="de-DE" altLang="de-DE" sz="4000" dirty="0" smtClean="0">
-                <a:solidFill>
-                  <a:srgbClr val="FFFFFF"/>
-                </a:solidFill>
-              </a:rPr>
-              <a:t>Teil 2 </a:t>
-            </a:r>
-            <a:r>
-              <a:rPr lang="de-DE" altLang="de-DE" sz="4000" dirty="0" smtClean="0">
-                <a:solidFill>
-                  <a:srgbClr val="FFFFFF"/>
-                </a:solidFill>
-              </a:rPr>
-              <a:t>(2)</a:t>
+              <a:t>Zu Teil 2 (2)</a:t>
             </a:r>
           </a:p>
         </p:txBody>
@@ -12353,39 +12321,7 @@
                   <a:srgbClr val="FFFFFF"/>
                 </a:solidFill>
               </a:rPr>
-              <a:t>Zu </a:t>
-            </a:r>
-            <a:r>
-              <a:rPr lang="de-DE" altLang="de-DE" sz="4000" dirty="0" smtClean="0">
-                <a:solidFill>
-                  <a:srgbClr val="FFFFFF"/>
-                </a:solidFill>
-              </a:rPr>
-              <a:t>Tei</a:t>
-            </a:r>
-            <a:r>
-              <a:rPr lang="de-DE" altLang="de-DE" sz="4000" dirty="0" smtClean="0">
-                <a:solidFill>
-                  <a:srgbClr val="FFFFFF"/>
-                </a:solidFill>
-              </a:rPr>
-              <a:t>l </a:t>
-            </a:r>
-            <a:r>
-              <a:rPr lang="de-DE" altLang="de-DE" sz="4000" dirty="0" smtClean="0">
-                <a:solidFill>
-                  <a:srgbClr val="FFFFFF"/>
-                </a:solidFill>
-              </a:rPr>
-              <a:t>2 </a:t>
-            </a:r>
-            <a:r>
-              <a:rPr lang="de-DE" altLang="de-DE" sz="4000" dirty="0" smtClean="0">
-                <a:solidFill>
-                  <a:srgbClr val="FFFFFF"/>
-                </a:solidFill>
-              </a:rPr>
-              <a:t>(3)</a:t>
+              <a:t>Zu Teil 2 (3)</a:t>
             </a:r>
           </a:p>
         </p:txBody>
@@ -18348,27 +18284,35 @@
               </a:tabLst>
             </a:pPr>
             <a:r>
-              <a:rPr lang="de-DE" altLang="de-DE" sz="2800" smtClean="0"/>
+              <a:rPr lang="de-DE" altLang="de-DE" sz="2800" dirty="0" smtClean="0"/>
               <a:t>Teilen Sie bitte bis spätestens Sonntag,</a:t>
             </a:r>
             <a:br>
-              <a:rPr lang="de-DE" altLang="de-DE" sz="2800" smtClean="0"/>
+              <a:rPr lang="de-DE" altLang="de-DE" sz="2800" dirty="0" smtClean="0"/>
             </a:br>
             <a:r>
-              <a:rPr lang="de-DE" altLang="de-DE" sz="2800" smtClean="0"/>
-              <a:t>den 10.05.2015, 24 Uhr mit, wie Sie Ihre Gruppen</a:t>
+              <a:rPr lang="de-DE" altLang="de-DE" sz="2800" dirty="0" smtClean="0"/>
+              <a:t>den </a:t>
+            </a:r>
+            <a:r>
+              <a:rPr lang="de-DE" altLang="de-DE" sz="2800" dirty="0" smtClean="0"/>
+              <a:t>15.05.2016, </a:t>
+            </a:r>
+            <a:r>
+              <a:rPr lang="de-DE" altLang="de-DE" sz="2800" dirty="0" smtClean="0"/>
+              <a:t>24 Uhr mit, wie Sie Ihre Gruppen</a:t>
             </a:r>
             <a:br>
-              <a:rPr lang="de-DE" altLang="de-DE" sz="2800" smtClean="0"/>
+              <a:rPr lang="de-DE" altLang="de-DE" sz="2800" dirty="0" smtClean="0"/>
             </a:br>
             <a:r>
-              <a:rPr lang="de-DE" altLang="de-DE" sz="2800" smtClean="0"/>
+              <a:rPr lang="de-DE" altLang="de-DE" sz="2800" dirty="0" smtClean="0"/>
               <a:t>für die Hausarbeit aufteilen.</a:t>
             </a:r>
             <a:br>
-              <a:rPr lang="de-DE" altLang="de-DE" sz="2800" smtClean="0"/>
+              <a:rPr lang="de-DE" altLang="de-DE" sz="2800" dirty="0" smtClean="0"/>
             </a:br>
-            <a:endParaRPr lang="de-DE" altLang="de-DE" sz="2800" smtClean="0"/>
+            <a:endParaRPr lang="de-DE" altLang="de-DE" sz="2800" dirty="0" smtClean="0"/>
           </a:p>
           <a:p>
             <a:pPr marL="269875" indent="-269875" eaLnBrk="1">
@@ -18394,9 +18338,30 @@
               </a:tabLst>
             </a:pPr>
             <a:r>
-              <a:rPr lang="de-DE" altLang="de-DE" sz="2800" smtClean="0"/>
-              <a:t>Möglich sind nur Zweier- oder Dreiergruppen.</a:t>
-            </a:r>
+              <a:rPr lang="de-DE" altLang="de-DE" sz="2800" dirty="0" smtClean="0"/>
+              <a:t>Möglich sind nur </a:t>
+            </a:r>
+            <a:r>
+              <a:rPr lang="de-DE" altLang="de-DE" sz="2800" dirty="0" smtClean="0"/>
+              <a:t>Dreier- </a:t>
+            </a:r>
+            <a:r>
+              <a:rPr lang="de-DE" altLang="de-DE" sz="2800" dirty="0" smtClean="0"/>
+              <a:t>oder </a:t>
+            </a:r>
+            <a:r>
+              <a:rPr lang="de-DE" altLang="de-DE" sz="2800" dirty="0" smtClean="0"/>
+              <a:t>Vierer</a:t>
+            </a:r>
+            <a:r>
+              <a:rPr lang="de-DE" altLang="de-DE" sz="2800" dirty="0" smtClean="0"/>
+              <a:t>gruppen</a:t>
+            </a:r>
+            <a:r>
+              <a:rPr lang="de-DE" altLang="de-DE" sz="2800" dirty="0"/>
+              <a:t>.</a:t>
+            </a:r>
+            <a:endParaRPr lang="de-DE" altLang="de-DE" sz="2800" dirty="0" smtClean="0"/>
           </a:p>
           <a:p>
             <a:pPr marL="269875" indent="-269875" eaLnBrk="1">
@@ -18422,14 +18387,18 @@
               </a:tabLst>
             </a:pPr>
             <a:r>
-              <a:rPr lang="de-DE" altLang="de-DE" sz="2800" smtClean="0"/>
-              <a:t>Dreiergruppen haben eine Zusatzaufgabe zu bearbeiten</a:t>
+              <a:rPr lang="de-DE" altLang="de-DE" sz="2800" dirty="0" smtClean="0"/>
+              <a:t>Alle Gruppen haben exakt dieselbe Aufgabe zu bearbeiten.</a:t>
+            </a:r>
+            <a:r>
+              <a:rPr lang="de-DE" altLang="de-DE" sz="2800" dirty="0" smtClean="0"/>
+              <a:t/>
             </a:r>
             <a:br>
-              <a:rPr lang="de-DE" altLang="de-DE" sz="2800" smtClean="0"/>
+              <a:rPr lang="de-DE" altLang="de-DE" sz="2800" dirty="0" smtClean="0"/>
             </a:br>
             <a:r>
-              <a:rPr lang="de-DE" altLang="de-DE" sz="2800" smtClean="0"/>
+              <a:rPr lang="de-DE" altLang="de-DE" sz="2800" dirty="0" smtClean="0"/>
               <a:t> </a:t>
             </a:r>
           </a:p>
@@ -18457,19 +18426,24 @@
               </a:tabLst>
             </a:pPr>
             <a:r>
-              <a:rPr lang="de-DE" altLang="de-DE" sz="2800" smtClean="0"/>
+              <a:rPr lang="de-DE" altLang="de-DE" sz="2800" dirty="0" smtClean="0"/>
               <a:t>Die Mitteilung erfolgt an die E-Mail des Dozenten (</a:t>
             </a:r>
             <a:r>
-              <a:rPr lang="de-DE" altLang="de-DE" sz="2800" smtClean="0">
+              <a:rPr lang="de-DE" altLang="de-DE" sz="2800" dirty="0" smtClean="0">
                 <a:hlinkClick r:id="rId3"/>
               </a:rPr>
               <a:t>bjoern.kimminich@nordakademie.de</a:t>
             </a:r>
             <a:r>
-              <a:rPr lang="de-DE" altLang="de-DE" sz="2800" smtClean="0"/>
-              <a:t>) und enthält die Namen aller Studenten der Gruppe sowie einen Teamnamen.</a:t>
-            </a:r>
+              <a:rPr lang="de-DE" altLang="de-DE" sz="2800" dirty="0" smtClean="0"/>
+              <a:t>) und enthält die Namen aller Studenten der </a:t>
+            </a:r>
+            <a:r>
+              <a:rPr lang="de-DE" altLang="de-DE" sz="2800" dirty="0" smtClean="0"/>
+              <a:t>Gruppe.</a:t>
+            </a:r>
+            <a:endParaRPr lang="de-DE" altLang="de-DE" sz="2800" dirty="0" smtClean="0"/>
           </a:p>
           <a:p>
             <a:pPr marL="269875" indent="-269875" eaLnBrk="1">
@@ -18494,7 +18468,7 @@
                 <a:tab pos="8686800" algn="l"/>
               </a:tabLst>
             </a:pPr>
-            <a:endParaRPr lang="de-DE" altLang="de-DE" smtClean="0"/>
+            <a:endParaRPr lang="de-DE" altLang="de-DE" dirty="0" smtClean="0"/>
           </a:p>
           <a:p>
             <a:pPr marL="269875" indent="-269875" eaLnBrk="1">
@@ -18519,7 +18493,7 @@
                 <a:tab pos="8686800" algn="l"/>
               </a:tabLst>
             </a:pPr>
-            <a:endParaRPr lang="de-DE" altLang="de-DE" smtClean="0"/>
+            <a:endParaRPr lang="de-DE" altLang="de-DE" dirty="0" smtClean="0"/>
           </a:p>
         </p:txBody>
       </p:sp>
@@ -18737,11 +18711,6 @@
               </a:rPr>
               <a:t>Übung (Teil 5)</a:t>
             </a:r>
-            <a:endParaRPr lang="de-DE" altLang="de-DE" sz="4000" dirty="0" smtClean="0">
-              <a:solidFill>
-                <a:srgbClr val="FFFFFF"/>
-              </a:solidFill>
-            </a:endParaRPr>
           </a:p>
         </p:txBody>
       </p:sp>
@@ -18829,11 +18798,7 @@
             </a:r>
             <a:r>
               <a:rPr lang="de-DE" altLang="de-DE" sz="2400" dirty="0" smtClean="0"/>
-              <a:t> </a:t>
-            </a:r>
-            <a:r>
-              <a:rPr lang="de-DE" altLang="de-DE" sz="2400" dirty="0" smtClean="0"/>
-              <a:t>um eine Methode</a:t>
+              <a:t> um eine Methode</a:t>
             </a:r>
             <a:br>
               <a:rPr lang="de-DE" altLang="de-DE" sz="2400" dirty="0" smtClean="0"/>
@@ -18847,11 +18812,7 @@
             </a:r>
             <a:r>
               <a:rPr lang="de-DE" altLang="de-DE" sz="2400" dirty="0" smtClean="0"/>
-              <a:t>, </a:t>
-            </a:r>
-            <a:r>
-              <a:rPr lang="de-DE" altLang="de-DE" sz="2400" dirty="0" smtClean="0"/>
-              <a:t>welche </a:t>
+              <a:t>, welche </a:t>
             </a:r>
             <a:r>
               <a:rPr lang="de-DE" altLang="de-DE" sz="2400" dirty="0" err="1" smtClean="0">
@@ -18862,11 +18823,7 @@
             </a:r>
             <a:r>
               <a:rPr lang="de-DE" altLang="de-DE" sz="2400" dirty="0" smtClean="0"/>
-              <a:t> </a:t>
-            </a:r>
-            <a:r>
-              <a:rPr lang="de-DE" altLang="de-DE" sz="2400" dirty="0" smtClean="0"/>
-              <a:t>zurückliefert, wenn die</a:t>
+              <a:t> zurückliefert, wenn die</a:t>
             </a:r>
             <a:br>
               <a:rPr lang="de-DE" altLang="de-DE" sz="2400" dirty="0" smtClean="0"/>
@@ -18923,11 +18880,7 @@
             </a:r>
             <a:r>
               <a:rPr lang="de-DE" altLang="de-DE" sz="2400" dirty="0" smtClean="0"/>
-              <a:t> </a:t>
-            </a:r>
-            <a:r>
-              <a:rPr lang="de-DE" altLang="de-DE" sz="2400" dirty="0" smtClean="0"/>
-              <a:t>an geeigneter Stelle ab, ob der</a:t>
+              <a:t> an geeigneter Stelle ab, ob der</a:t>
             </a:r>
             <a:br>
               <a:rPr lang="de-DE" altLang="de-DE" sz="2400" dirty="0" smtClean="0"/>
@@ -18963,11 +18916,7 @@
             </a:r>
             <a:r>
               <a:rPr lang="de-DE" altLang="de-DE" sz="2400" dirty="0" smtClean="0"/>
-              <a:t> </a:t>
-            </a:r>
-            <a:r>
-              <a:rPr lang="de-DE" altLang="de-DE" sz="2400" dirty="0" smtClean="0"/>
-              <a:t>um eine entsprechende</a:t>
+              <a:t> um eine entsprechende</a:t>
             </a:r>
             <a:br>
               <a:rPr lang="de-DE" altLang="de-DE" sz="2400" dirty="0" smtClean="0"/>
@@ -19291,21 +19240,8 @@
                   <a:srgbClr val="FFFFFF"/>
                 </a:solidFill>
               </a:rPr>
-              <a:t>Übung </a:t>
-            </a:r>
-            <a:r>
-              <a:rPr lang="de-DE" altLang="de-DE" sz="4000" dirty="0" smtClean="0">
-                <a:solidFill>
-                  <a:srgbClr val="FFFFFF"/>
-                </a:solidFill>
-              </a:rPr>
-              <a:t>(Teil 6)</a:t>
-            </a:r>
-            <a:endParaRPr lang="de-DE" altLang="de-DE" sz="4000" dirty="0" smtClean="0">
-              <a:solidFill>
-                <a:srgbClr val="FFFFFF"/>
-              </a:solidFill>
-            </a:endParaRPr>
+              <a:t>Übung (Teil 6)</a:t>
+            </a:r>
           </a:p>
         </p:txBody>
       </p:sp>
@@ -19353,11 +19289,7 @@
             </a:pPr>
             <a:r>
               <a:rPr lang="de-DE" altLang="de-DE" sz="2400" dirty="0" smtClean="0"/>
-              <a:t>Erweitern </a:t>
-            </a:r>
-            <a:r>
-              <a:rPr lang="de-DE" altLang="de-DE" sz="2400" dirty="0" smtClean="0"/>
-              <a:t>Sie die Klasse </a:t>
+              <a:t>Erweitern Sie die Klasse </a:t>
             </a:r>
             <a:r>
               <a:rPr lang="de-DE" altLang="de-DE" sz="2400" dirty="0" smtClean="0">
@@ -19368,11 +19300,7 @@
             </a:r>
             <a:r>
               <a:rPr lang="de-DE" altLang="de-DE" sz="2400" dirty="0" smtClean="0"/>
-              <a:t> </a:t>
-            </a:r>
-            <a:r>
-              <a:rPr lang="de-DE" altLang="de-DE" sz="2400" dirty="0" smtClean="0"/>
-              <a:t>um eine Methode</a:t>
+              <a:t> um eine Methode</a:t>
             </a:r>
             <a:br>
               <a:rPr lang="de-DE" altLang="de-DE" sz="2400" dirty="0" smtClean="0"/>
@@ -19386,11 +19314,7 @@
             </a:r>
             <a:r>
               <a:rPr lang="de-DE" altLang="de-DE" sz="2400" dirty="0" smtClean="0"/>
-              <a:t>, </a:t>
-            </a:r>
-            <a:r>
-              <a:rPr lang="de-DE" altLang="de-DE" sz="2400" dirty="0" smtClean="0"/>
-              <a:t>welche </a:t>
+              <a:t>, welche </a:t>
             </a:r>
             <a:r>
               <a:rPr lang="de-DE" altLang="de-DE" sz="2400" dirty="0" err="1" smtClean="0">
@@ -19401,19 +19325,7 @@
             </a:r>
             <a:r>
               <a:rPr lang="de-DE" altLang="de-DE" sz="2400" dirty="0" smtClean="0"/>
-              <a:t> </a:t>
-            </a:r>
-            <a:r>
-              <a:rPr lang="de-DE" altLang="de-DE" sz="2400" dirty="0" smtClean="0"/>
-              <a:t>zurückliefert, wenn die </a:t>
-            </a:r>
-            <a:r>
-              <a:rPr lang="de-DE" altLang="de-DE" sz="2400" dirty="0" smtClean="0"/>
-              <a:t>Kartenhand aus </a:t>
-            </a:r>
-            <a:r>
-              <a:rPr lang="de-DE" altLang="de-DE" sz="2400" dirty="0" smtClean="0"/>
-              <a:t>nur 2 Karten besteht und 21 Punkte ergibt.</a:t>
+              <a:t> zurückliefert, wenn die Kartenhand aus nur 2 Karten besteht und 21 Punkte ergibt.</a:t>
             </a:r>
             <a:br>
               <a:rPr lang="de-DE" altLang="de-DE" sz="2400" dirty="0" smtClean="0"/>
@@ -19456,11 +19368,7 @@
             </a:r>
             <a:r>
               <a:rPr lang="de-DE" altLang="de-DE" sz="2400" dirty="0" smtClean="0"/>
-              <a:t> </a:t>
-            </a:r>
-            <a:r>
-              <a:rPr lang="de-DE" altLang="de-DE" sz="2400" dirty="0" smtClean="0"/>
-              <a:t>der Kartenhand</a:t>
+              <a:t> der Kartenhand</a:t>
             </a:r>
             <a:br>
               <a:rPr lang="de-DE" altLang="de-DE" sz="2400" dirty="0" smtClean="0"/>
@@ -19534,11 +19442,7 @@
             </a:r>
             <a:r>
               <a:rPr lang="de-DE" altLang="de-DE" sz="2400" dirty="0" smtClean="0"/>
-              <a:t> </a:t>
-            </a:r>
-            <a:r>
-              <a:rPr lang="de-DE" altLang="de-DE" sz="2400" dirty="0" smtClean="0"/>
-              <a:t>und</a:t>
+              <a:t> und</a:t>
             </a:r>
             <a:br>
               <a:rPr lang="de-DE" altLang="de-DE" sz="2400" dirty="0" smtClean="0"/>
@@ -19552,11 +19456,7 @@
             </a:r>
             <a:r>
               <a:rPr lang="de-DE" altLang="de-DE" sz="2400" dirty="0" smtClean="0"/>
-              <a:t> </a:t>
-            </a:r>
-            <a:r>
-              <a:rPr lang="de-DE" altLang="de-DE" sz="2400" dirty="0" smtClean="0"/>
-              <a:t>der Klasse </a:t>
+              <a:t> der Klasse </a:t>
             </a:r>
             <a:r>
               <a:rPr lang="de-DE" altLang="de-DE" sz="2400" dirty="0" smtClean="0">
@@ -19569,7 +19469,6 @@
               <a:rPr lang="de-DE" altLang="de-DE" sz="2400" dirty="0" smtClean="0"/>
               <a:t>.</a:t>
             </a:r>
-            <a:endParaRPr lang="de-DE" altLang="de-DE" sz="2400" dirty="0" smtClean="0"/>
           </a:p>
           <a:p>
             <a:pPr marL="269875" indent="-269875" eaLnBrk="1">
@@ -19835,21 +19734,8 @@
                   <a:srgbClr val="FFFFFF"/>
                 </a:solidFill>
               </a:rPr>
-              <a:t>Übung </a:t>
-            </a:r>
-            <a:r>
-              <a:rPr lang="de-DE" altLang="de-DE" sz="4000" dirty="0" smtClean="0">
-                <a:solidFill>
-                  <a:srgbClr val="FFFFFF"/>
-                </a:solidFill>
-              </a:rPr>
-              <a:t>(Teil 7)</a:t>
-            </a:r>
-            <a:endParaRPr lang="de-DE" altLang="de-DE" sz="4000" dirty="0" smtClean="0">
-              <a:solidFill>
-                <a:srgbClr val="FFFFFF"/>
-              </a:solidFill>
-            </a:endParaRPr>
+              <a:t>Übung (Teil 7)</a:t>
+            </a:r>
           </a:p>
         </p:txBody>
       </p:sp>
@@ -19897,11 +19783,7 @@
             </a:pPr>
             <a:r>
               <a:rPr lang="de-DE" altLang="de-DE" sz="2400" dirty="0" smtClean="0"/>
-              <a:t>Vor </a:t>
-            </a:r>
-            <a:r>
-              <a:rPr lang="de-DE" altLang="de-DE" sz="2400" dirty="0" smtClean="0"/>
-              <a:t>dem Spiel am Black-Jack-Tisch soll ein Geldeinsatz getätigt</a:t>
+              <a:t>Vor dem Spiel am Black-Jack-Tisch soll ein Geldeinsatz getätigt</a:t>
             </a:r>
             <a:br>
               <a:rPr lang="de-DE" altLang="de-DE" sz="2400" dirty="0" smtClean="0"/>
@@ -19915,11 +19797,7 @@
             </a:br>
             <a:r>
               <a:rPr lang="de-DE" altLang="de-DE" sz="2400" dirty="0" smtClean="0"/>
-              <a:t>und 1000 Euro</a:t>
-            </a:r>
-            <a:r>
-              <a:rPr lang="de-DE" altLang="de-DE" sz="2400" dirty="0" smtClean="0"/>
-              <a:t>.</a:t>
+              <a:t>und 1000 Euro.</a:t>
             </a:r>
           </a:p>
           <a:p>
@@ -19980,11 +19858,7 @@
             </a:r>
             <a:r>
               <a:rPr lang="de-DE" altLang="de-DE" sz="2400" dirty="0" smtClean="0"/>
-              <a:t> der Spieler </a:t>
-            </a:r>
-            <a:r>
-              <a:rPr lang="de-DE" altLang="de-DE" sz="2400" dirty="0" smtClean="0"/>
-              <a:t>erhält:</a:t>
+              <a:t> der Spieler erhält:</a:t>
             </a:r>
           </a:p>
           <a:p>
@@ -20012,15 +19886,7 @@
             </a:pPr>
             <a:r>
               <a:rPr lang="de-DE" altLang="de-DE" sz="2000" dirty="0" smtClean="0"/>
-              <a:t>Verliert </a:t>
-            </a:r>
-            <a:r>
-              <a:rPr lang="de-DE" altLang="de-DE" sz="2000" dirty="0" smtClean="0"/>
-              <a:t>er, erhält er nichts</a:t>
-            </a:r>
-            <a:r>
-              <a:rPr lang="de-DE" altLang="de-DE" sz="2000" dirty="0" smtClean="0"/>
-              <a:t>.</a:t>
+              <a:t>Verliert er, erhält er nichts.</a:t>
             </a:r>
           </a:p>
           <a:p>
@@ -20048,15 +19914,7 @@
             </a:pPr>
             <a:r>
               <a:rPr lang="de-DE" altLang="de-DE" sz="2000" dirty="0" smtClean="0"/>
-              <a:t>Bei </a:t>
-            </a:r>
-            <a:r>
-              <a:rPr lang="de-DE" altLang="de-DE" sz="2000" dirty="0" smtClean="0"/>
-              <a:t>Unentschieden erhält er den Einsatz zurück</a:t>
-            </a:r>
-            <a:r>
-              <a:rPr lang="de-DE" altLang="de-DE" sz="2000" dirty="0" smtClean="0"/>
-              <a:t>.</a:t>
+              <a:t>Bei Unentschieden erhält er den Einsatz zurück.</a:t>
             </a:r>
           </a:p>
           <a:p>
@@ -20084,22 +19942,14 @@
             </a:pPr>
             <a:r>
               <a:rPr lang="de-DE" altLang="de-DE" sz="2000" dirty="0" smtClean="0"/>
-              <a:t>Gewinnt </a:t>
-            </a:r>
-            <a:r>
-              <a:rPr lang="de-DE" altLang="de-DE" sz="2000" dirty="0" smtClean="0"/>
-              <a:t>der Spieler, erhält er seinen Einsatz zurück plus einen</a:t>
+              <a:t>Gewinnt der Spieler, erhält er seinen Einsatz zurück plus einen</a:t>
             </a:r>
             <a:br>
               <a:rPr lang="de-DE" altLang="de-DE" sz="2000" dirty="0" smtClean="0"/>
             </a:br>
             <a:r>
               <a:rPr lang="de-DE" altLang="de-DE" sz="2000" dirty="0" smtClean="0"/>
-              <a:t>Gewinn in Höhe</a:t>
-            </a:r>
-            <a:r>
-              <a:rPr lang="de-DE" altLang="de-DE" sz="2000" dirty="0" smtClean="0"/>
-              <a:t>:</a:t>
+              <a:t>Gewinn in Höhe:</a:t>
             </a:r>
           </a:p>
           <a:p>
@@ -20127,15 +19977,7 @@
             </a:pPr>
             <a:r>
               <a:rPr lang="de-DE" altLang="de-DE" sz="1600" dirty="0" smtClean="0"/>
-              <a:t>des </a:t>
-            </a:r>
-            <a:r>
-              <a:rPr lang="de-DE" altLang="de-DE" sz="1600" dirty="0" smtClean="0"/>
-              <a:t>Einsatzes bei einem "normalen" </a:t>
-            </a:r>
-            <a:r>
-              <a:rPr lang="de-DE" altLang="de-DE" sz="1600" dirty="0" smtClean="0"/>
-              <a:t>Sieg</a:t>
+              <a:t>des Einsatzes bei einem "normalen" Sieg</a:t>
             </a:r>
           </a:p>
           <a:p>
@@ -20163,15 +20005,7 @@
             </a:pPr>
             <a:r>
               <a:rPr lang="de-DE" altLang="de-DE" sz="1600" dirty="0" smtClean="0"/>
-              <a:t>des </a:t>
-            </a:r>
-            <a:r>
-              <a:rPr lang="de-DE" altLang="de-DE" sz="1600" dirty="0" smtClean="0"/>
-              <a:t>1,5-fachen Einsatzes bei einem Siebener-Drilling </a:t>
-            </a:r>
-            <a:r>
-              <a:rPr lang="de-DE" altLang="de-DE" sz="1600" dirty="0" smtClean="0"/>
-              <a:t>sowie</a:t>
+              <a:t>des 1,5-fachen Einsatzes bei einem Siebener-Drilling sowie</a:t>
             </a:r>
           </a:p>
           <a:p>
@@ -20199,11 +20033,7 @@
             </a:pPr>
             <a:r>
               <a:rPr lang="de-DE" altLang="de-DE" sz="1600" dirty="0" smtClean="0"/>
-              <a:t>des </a:t>
-            </a:r>
-            <a:r>
-              <a:rPr lang="de-DE" altLang="de-DE" sz="1600" dirty="0" smtClean="0"/>
-              <a:t>1,5-fachen Einsatzes bei einem Black Jack.</a:t>
+              <a:t>des 1,5-fachen Einsatzes bei einem Black Jack.</a:t>
             </a:r>
             <a:br>
               <a:rPr lang="de-DE" altLang="de-DE" sz="1600" dirty="0" smtClean="0"/>
@@ -20236,10 +20066,6 @@
             <a:r>
               <a:rPr lang="de-DE" altLang="de-DE" sz="2400" dirty="0" smtClean="0"/>
               <a:t>Der Einsatz soll bei jedem Spielschritt ausgegeben werden. </a:t>
-            </a:r>
-            <a:r>
-              <a:rPr lang="de-DE" altLang="de-DE" sz="2400" dirty="0" smtClean="0"/>
-              <a:t/>
             </a:r>
             <a:br>
               <a:rPr lang="de-DE" altLang="de-DE" sz="2400" dirty="0" smtClean="0"/>
@@ -20485,21 +20311,8 @@
                   <a:srgbClr val="FFFFFF"/>
                 </a:solidFill>
               </a:rPr>
-              <a:t>Übung </a:t>
-            </a:r>
-            <a:r>
-              <a:rPr lang="de-DE" altLang="de-DE" sz="4000" dirty="0" smtClean="0">
-                <a:solidFill>
-                  <a:srgbClr val="FFFFFF"/>
-                </a:solidFill>
-              </a:rPr>
-              <a:t>(Teil 8)</a:t>
-            </a:r>
-            <a:endParaRPr lang="de-DE" altLang="de-DE" sz="4000" dirty="0" smtClean="0">
-              <a:solidFill>
-                <a:srgbClr val="FFFFFF"/>
-              </a:solidFill>
-            </a:endParaRPr>
+              <a:t>Übung (Teil 8)</a:t>
+            </a:r>
           </a:p>
         </p:txBody>
       </p:sp>
@@ -20547,11 +20360,7 @@
             </a:pPr>
             <a:r>
               <a:rPr lang="de-DE" altLang="de-DE" sz="2400" dirty="0" smtClean="0"/>
-              <a:t>Der </a:t>
-            </a:r>
-            <a:r>
-              <a:rPr lang="de-DE" altLang="de-DE" sz="2400" dirty="0" smtClean="0"/>
-              <a:t>Geber erhält die erste Karte zusammen mit den ersten</a:t>
+              <a:t>Der Geber erhält die erste Karte zusammen mit den ersten</a:t>
             </a:r>
             <a:br>
               <a:rPr lang="de-DE" altLang="de-DE" sz="2400" dirty="0" smtClean="0"/>
@@ -20597,15 +20406,7 @@
             </a:pPr>
             <a:r>
               <a:rPr lang="de-DE" altLang="de-DE" sz="2400" dirty="0" smtClean="0"/>
-              <a:t>Ergänzen Sie die "double-Regel", </a:t>
-            </a:r>
-            <a:r>
-              <a:rPr lang="de-DE" altLang="de-DE" sz="2400" dirty="0" smtClean="0"/>
-              <a:t>d.h</a:t>
-            </a:r>
-            <a:r>
-              <a:rPr lang="de-DE" altLang="de-DE" sz="2400" dirty="0" smtClean="0"/>
-              <a:t>. bei seinem ersten</a:t>
+              <a:t>Ergänzen Sie die "double-Regel", d.h. bei seinem ersten</a:t>
             </a:r>
             <a:br>
               <a:rPr lang="de-DE" altLang="de-DE" sz="2400" dirty="0" smtClean="0"/>
@@ -20886,21 +20687,8 @@
                   <a:srgbClr val="FFFFFF"/>
                 </a:solidFill>
               </a:rPr>
-              <a:t>Übung </a:t>
-            </a:r>
-            <a:r>
-              <a:rPr lang="de-DE" altLang="de-DE" sz="4000" dirty="0" smtClean="0">
-                <a:solidFill>
-                  <a:srgbClr val="FFFFFF"/>
-                </a:solidFill>
-              </a:rPr>
-              <a:t>(Teil 9)</a:t>
-            </a:r>
-            <a:endParaRPr lang="de-DE" altLang="de-DE" sz="4000" dirty="0" smtClean="0">
-              <a:solidFill>
-                <a:srgbClr val="FFFFFF"/>
-              </a:solidFill>
-            </a:endParaRPr>
+              <a:t>Übung (Teil 9)</a:t>
+            </a:r>
           </a:p>
         </p:txBody>
       </p:sp>
@@ -20948,11 +20736,7 @@
             </a:pPr>
             <a:r>
               <a:rPr lang="de-DE" altLang="de-DE" sz="2400" dirty="0" smtClean="0"/>
-              <a:t>Ergänzen </a:t>
-            </a:r>
-            <a:r>
-              <a:rPr lang="de-DE" altLang="de-DE" sz="2400" dirty="0" smtClean="0"/>
-              <a:t>Sie die "</a:t>
+              <a:t>Ergänzen Sie die "</a:t>
             </a:r>
             <a:r>
               <a:rPr lang="de-DE" altLang="de-DE" sz="2400" dirty="0" err="1" smtClean="0"/>
@@ -21367,21 +21151,8 @@
                   <a:srgbClr val="FFFFFF"/>
                 </a:solidFill>
               </a:rPr>
-              <a:t>Übung </a:t>
-            </a:r>
-            <a:r>
-              <a:rPr lang="de-DE" altLang="de-DE" sz="4000" dirty="0" smtClean="0">
-                <a:solidFill>
-                  <a:srgbClr val="FFFFFF"/>
-                </a:solidFill>
-              </a:rPr>
-              <a:t>(Teil 10)</a:t>
-            </a:r>
-            <a:endParaRPr lang="de-DE" altLang="de-DE" sz="4000" dirty="0" smtClean="0">
-              <a:solidFill>
-                <a:srgbClr val="FFFFFF"/>
-              </a:solidFill>
-            </a:endParaRPr>
+              <a:t>Übung (Teil 10)</a:t>
+            </a:r>
           </a:p>
         </p:txBody>
       </p:sp>
@@ -21429,11 +21200,7 @@
             </a:pPr>
             <a:r>
               <a:rPr lang="de-DE" altLang="de-DE" sz="2400" dirty="0" smtClean="0"/>
-              <a:t>Das </a:t>
-            </a:r>
-            <a:r>
-              <a:rPr lang="de-DE" altLang="de-DE" sz="2400" dirty="0" smtClean="0"/>
-              <a:t>Spiel soll nun nicht nach einer Runde zu Ende sein.</a:t>
+              <a:t>Das Spiel soll nun nicht nach einer Runde zu Ende sein.</a:t>
             </a:r>
             <a:br>
               <a:rPr lang="de-DE" altLang="de-DE" sz="2400" dirty="0" smtClean="0"/>
@@ -21574,11 +21341,7 @@
             </a:pPr>
             <a:r>
               <a:rPr lang="de-DE" altLang="de-DE" sz="2400" dirty="0" smtClean="0"/>
-              <a:t>Solange </a:t>
-            </a:r>
-            <a:r>
-              <a:rPr lang="de-DE" altLang="de-DE" sz="2400" dirty="0" smtClean="0"/>
-              <a:t>das nicht der Fall ist, fragt das Programm nach jedem</a:t>
+              <a:t>Solange das nicht der Fall ist, fragt das Programm nach jedem</a:t>
             </a:r>
             <a:br>
               <a:rPr lang="de-DE" altLang="de-DE" sz="2400" dirty="0" smtClean="0"/>
@@ -21624,11 +21387,7 @@
             </a:pPr>
             <a:r>
               <a:rPr lang="de-DE" altLang="de-DE" sz="2400" dirty="0" smtClean="0"/>
-              <a:t>Das Budget soll bei jedem Spielschritt ebenfalls ausgegeben werden</a:t>
-            </a:r>
-            <a:r>
-              <a:rPr lang="de-DE" altLang="de-DE" sz="2400" dirty="0" smtClean="0"/>
-              <a:t>.</a:t>
+              <a:t>Das Budget soll bei jedem Spielschritt ebenfalls ausgegeben werden.</a:t>
             </a:r>
             <a:endParaRPr lang="de-DE" altLang="de-DE" dirty="0" smtClean="0"/>
           </a:p>
@@ -22381,37 +22140,13 @@
             </a:r>
             <a:r>
               <a:rPr lang="de-DE" altLang="de-DE" sz="2800" dirty="0" smtClean="0"/>
-              <a:t> </a:t>
-            </a:r>
-            <a:r>
-              <a:rPr lang="de-DE" altLang="de-DE" sz="2800" dirty="0" smtClean="0"/>
-              <a:t>finden Sie eine Beispiellösung für </a:t>
-            </a:r>
-            <a:r>
-              <a:rPr lang="de-DE" altLang="de-DE" sz="2800" dirty="0" smtClean="0"/>
-              <a:t>Teil 1+2 der Übung</a:t>
-            </a:r>
-            <a:r>
-              <a:rPr lang="de-DE" altLang="de-DE" sz="2800" dirty="0" smtClean="0"/>
-              <a:t>: </a:t>
+              <a:t> finden Sie eine Beispiellösung für Teil 1+2 der Übung: </a:t>
             </a:r>
             <a:r>
               <a:rPr lang="de-DE" altLang="de-DE" sz="2400" dirty="0" smtClean="0">
                 <a:hlinkClick r:id="rId3"/>
               </a:rPr>
-              <a:t>https</a:t>
-            </a:r>
-            <a:r>
-              <a:rPr lang="de-DE" altLang="de-DE" sz="2400" dirty="0" smtClean="0">
-                <a:hlinkClick r:id="rId3"/>
-              </a:rPr>
-              <a:t>://</a:t>
-            </a:r>
-            <a:r>
-              <a:rPr lang="de-DE" altLang="de-DE" sz="2400" dirty="0" smtClean="0">
-                <a:hlinkClick r:id="rId3"/>
-              </a:rPr>
-              <a:t>github.com/nordakademie-einfuehrung-java/beispielloesungen/tree/master/Uebungsblock_5_bis_8</a:t>
+              <a:t>https://github.com/nordakademie-einfuehrung-java/beispielloesungen/tree/master/Uebungsblock_5_bis_8</a:t>
             </a:r>
             <a:endParaRPr lang="de-DE" altLang="de-DE" sz="2400" dirty="0" smtClean="0"/>
           </a:p>
@@ -23986,21 +23721,8 @@
                   <a:srgbClr val="FFFFFF"/>
                 </a:solidFill>
               </a:rPr>
-              <a:t>Zu </a:t>
-            </a:r>
-            <a:r>
-              <a:rPr lang="de-DE" altLang="de-DE" sz="4000" dirty="0" smtClean="0">
-                <a:solidFill>
-                  <a:srgbClr val="FFFFFF"/>
-                </a:solidFill>
-              </a:rPr>
-              <a:t>Teil 1</a:t>
-            </a:r>
-            <a:endParaRPr lang="de-DE" altLang="de-DE" sz="4000" dirty="0" smtClean="0">
-              <a:solidFill>
-                <a:srgbClr val="FFFFFF"/>
-              </a:solidFill>
-            </a:endParaRPr>
+              <a:t>Zu Teil 1</a:t>
+            </a:r>
           </a:p>
         </p:txBody>
       </p:sp>
@@ -24400,7 +24122,7 @@
         <a:effectLst/>
         <a:extLst>
           <a:ext uri="{AF507438-7753-43E0-B8FC-AC1667EBCBE1}">
-            <a14:hiddenEffects xmlns:a14="http://schemas.microsoft.com/office/drawing/2010/main" xmlns="">
+            <a14:hiddenEffects xmlns:a14="http://schemas.microsoft.com/office/drawing/2010/main">
               <a:effectLst>
                 <a:outerShdw dist="35921" dir="2700000" algn="ctr" rotWithShape="0">
                   <a:schemeClr val="bg2"/>
@@ -24473,7 +24195,7 @@
         <a:effectLst/>
         <a:extLst>
           <a:ext uri="{AF507438-7753-43E0-B8FC-AC1667EBCBE1}">
-            <a14:hiddenEffects xmlns:a14="http://schemas.microsoft.com/office/drawing/2010/main" xmlns="">
+            <a14:hiddenEffects xmlns:a14="http://schemas.microsoft.com/office/drawing/2010/main">
               <a:effectLst>
                 <a:outerShdw dist="35921" dir="2700000" algn="ctr" rotWithShape="0">
                   <a:schemeClr val="bg2"/>
@@ -24809,7 +24531,7 @@
   </a:extraClrSchemeLst>
   <a:extLst>
     <a:ext uri="{05A4C25C-085E-4340-85A3-A5531E510DB2}">
-      <thm15:themeFamily xmlns:thm15="http://schemas.microsoft.com/office/thememl/2012/main" xmlns="" name="Office Theme" id="{62F939B6-93AF-4DB8-9C6B-D6C7DFDC589F}" vid="{4A3C46E8-61CC-4603-A589-7422A47A8E4A}"/>
+      <thm15:themeFamily xmlns:thm15="http://schemas.microsoft.com/office/thememl/2012/main" name="Office Theme" id="{62F939B6-93AF-4DB8-9C6B-D6C7DFDC589F}" vid="{4A3C46E8-61CC-4603-A589-7422A47A8E4A}"/>
     </a:ext>
   </a:extLst>
 </a:theme>
@@ -25070,7 +24792,7 @@
   <a:extraClrSchemeLst/>
   <a:extLst>
     <a:ext uri="{05A4C25C-085E-4340-85A3-A5531E510DB2}">
-      <thm15:themeFamily xmlns:thm15="http://schemas.microsoft.com/office/thememl/2012/main" xmlns="" name="Office Theme" id="{62F939B6-93AF-4DB8-9C6B-D6C7DFDC589F}" vid="{4A3C46E8-61CC-4603-A589-7422A47A8E4A}"/>
+      <thm15:themeFamily xmlns:thm15="http://schemas.microsoft.com/office/thememl/2012/main" name="Office Theme" id="{62F939B6-93AF-4DB8-9C6B-D6C7DFDC589F}" vid="{4A3C46E8-61CC-4603-A589-7422A47A8E4A}"/>
     </a:ext>
   </a:extLst>
 </a:theme>

</xml_diff>